<commit_message>
Inclusão de documentação e tela relatorio não iniciada
</commit_message>
<xml_diff>
--- a/Documentação/desenhos.pptx
+++ b/Documentação/desenhos.pptx
@@ -10,6 +10,7 @@
     <p:sldId id="258" r:id="rId4"/>
     <p:sldId id="259" r:id="rId5"/>
     <p:sldId id="260" r:id="rId6"/>
+    <p:sldId id="261" r:id="rId7"/>
   </p:sldIdLst>
   <p:sldSz cx="12192000" cy="6858000"/>
   <p:notesSz cx="6858000" cy="9144000"/>
@@ -247,7 +248,7 @@
           <a:p>
             <a:fld id="{81000FD5-C112-43D9-81EA-3561BAADBFD3}" type="datetimeFigureOut">
               <a:rPr lang="pt-BR" smtClean="0"/>
-              <a:t>23/05/2016</a:t>
+              <a:t>02/06/2016</a:t>
             </a:fld>
             <a:endParaRPr lang="pt-BR"/>
           </a:p>
@@ -417,7 +418,7 @@
           <a:p>
             <a:fld id="{81000FD5-C112-43D9-81EA-3561BAADBFD3}" type="datetimeFigureOut">
               <a:rPr lang="pt-BR" smtClean="0"/>
-              <a:t>23/05/2016</a:t>
+              <a:t>02/06/2016</a:t>
             </a:fld>
             <a:endParaRPr lang="pt-BR"/>
           </a:p>
@@ -597,7 +598,7 @@
           <a:p>
             <a:fld id="{81000FD5-C112-43D9-81EA-3561BAADBFD3}" type="datetimeFigureOut">
               <a:rPr lang="pt-BR" smtClean="0"/>
-              <a:t>23/05/2016</a:t>
+              <a:t>02/06/2016</a:t>
             </a:fld>
             <a:endParaRPr lang="pt-BR"/>
           </a:p>
@@ -767,7 +768,7 @@
           <a:p>
             <a:fld id="{81000FD5-C112-43D9-81EA-3561BAADBFD3}" type="datetimeFigureOut">
               <a:rPr lang="pt-BR" smtClean="0"/>
-              <a:t>23/05/2016</a:t>
+              <a:t>02/06/2016</a:t>
             </a:fld>
             <a:endParaRPr lang="pt-BR"/>
           </a:p>
@@ -1013,7 +1014,7 @@
           <a:p>
             <a:fld id="{81000FD5-C112-43D9-81EA-3561BAADBFD3}" type="datetimeFigureOut">
               <a:rPr lang="pt-BR" smtClean="0"/>
-              <a:t>23/05/2016</a:t>
+              <a:t>02/06/2016</a:t>
             </a:fld>
             <a:endParaRPr lang="pt-BR"/>
           </a:p>
@@ -1245,7 +1246,7 @@
           <a:p>
             <a:fld id="{81000FD5-C112-43D9-81EA-3561BAADBFD3}" type="datetimeFigureOut">
               <a:rPr lang="pt-BR" smtClean="0"/>
-              <a:t>23/05/2016</a:t>
+              <a:t>02/06/2016</a:t>
             </a:fld>
             <a:endParaRPr lang="pt-BR"/>
           </a:p>
@@ -1612,7 +1613,7 @@
           <a:p>
             <a:fld id="{81000FD5-C112-43D9-81EA-3561BAADBFD3}" type="datetimeFigureOut">
               <a:rPr lang="pt-BR" smtClean="0"/>
-              <a:t>23/05/2016</a:t>
+              <a:t>02/06/2016</a:t>
             </a:fld>
             <a:endParaRPr lang="pt-BR"/>
           </a:p>
@@ -1730,7 +1731,7 @@
           <a:p>
             <a:fld id="{81000FD5-C112-43D9-81EA-3561BAADBFD3}" type="datetimeFigureOut">
               <a:rPr lang="pt-BR" smtClean="0"/>
-              <a:t>23/05/2016</a:t>
+              <a:t>02/06/2016</a:t>
             </a:fld>
             <a:endParaRPr lang="pt-BR"/>
           </a:p>
@@ -1825,7 +1826,7 @@
           <a:p>
             <a:fld id="{81000FD5-C112-43D9-81EA-3561BAADBFD3}" type="datetimeFigureOut">
               <a:rPr lang="pt-BR" smtClean="0"/>
-              <a:t>23/05/2016</a:t>
+              <a:t>02/06/2016</a:t>
             </a:fld>
             <a:endParaRPr lang="pt-BR"/>
           </a:p>
@@ -2102,7 +2103,7 @@
           <a:p>
             <a:fld id="{81000FD5-C112-43D9-81EA-3561BAADBFD3}" type="datetimeFigureOut">
               <a:rPr lang="pt-BR" smtClean="0"/>
-              <a:t>23/05/2016</a:t>
+              <a:t>02/06/2016</a:t>
             </a:fld>
             <a:endParaRPr lang="pt-BR"/>
           </a:p>
@@ -2355,7 +2356,7 @@
           <a:p>
             <a:fld id="{81000FD5-C112-43D9-81EA-3561BAADBFD3}" type="datetimeFigureOut">
               <a:rPr lang="pt-BR" smtClean="0"/>
-              <a:t>23/05/2016</a:t>
+              <a:t>02/06/2016</a:t>
             </a:fld>
             <a:endParaRPr lang="pt-BR"/>
           </a:p>
@@ -2568,7 +2569,7 @@
           <a:p>
             <a:fld id="{81000FD5-C112-43D9-81EA-3561BAADBFD3}" type="datetimeFigureOut">
               <a:rPr lang="pt-BR" smtClean="0"/>
-              <a:t>23/05/2016</a:t>
+              <a:t>02/06/2016</a:t>
             </a:fld>
             <a:endParaRPr lang="pt-BR"/>
           </a:p>
@@ -3076,7 +3077,7 @@
           <a:p>
             <a:pPr algn="ctr"/>
             <a:r>
-              <a:rPr lang="pt-BR" sz="1200" dirty="0" smtClean="0">
+              <a:rPr lang="pt-BR" sz="1500" dirty="0" smtClean="0">
                 <a:solidFill>
                   <a:schemeClr val="tx1"/>
                 </a:solidFill>
@@ -3085,7 +3086,7 @@
               </a:rPr>
               <a:t>Planejamento da Coleção</a:t>
             </a:r>
-            <a:endParaRPr lang="pt-BR" sz="1200" dirty="0">
+            <a:endParaRPr lang="pt-BR" sz="1500" dirty="0">
               <a:latin typeface="Arial" panose="020B0604020202020204" pitchFamily="34" charset="0"/>
               <a:cs typeface="Arial" panose="020B0604020202020204" pitchFamily="34" charset="0"/>
             </a:endParaRPr>
@@ -3191,7 +3192,7 @@
           <a:p>
             <a:pPr algn="ctr"/>
             <a:r>
-              <a:rPr lang="pt-BR" sz="1200" dirty="0" smtClean="0">
+              <a:rPr lang="pt-BR" sz="1500" dirty="0" smtClean="0">
                 <a:solidFill>
                   <a:schemeClr val="tx1"/>
                 </a:solidFill>
@@ -3200,7 +3201,7 @@
               </a:rPr>
               <a:t>Planejamento do Processo Produtivo</a:t>
             </a:r>
-            <a:endParaRPr lang="pt-BR" sz="1200" dirty="0">
+            <a:endParaRPr lang="pt-BR" sz="1500" dirty="0">
               <a:latin typeface="Arial" panose="020B0604020202020204" pitchFamily="34" charset="0"/>
               <a:cs typeface="Arial" panose="020B0604020202020204" pitchFamily="34" charset="0"/>
             </a:endParaRPr>
@@ -3306,7 +3307,7 @@
           <a:p>
             <a:pPr algn="ctr"/>
             <a:r>
-              <a:rPr lang="pt-BR" sz="1200" dirty="0" smtClean="0">
+              <a:rPr lang="pt-BR" sz="1500" dirty="0" smtClean="0">
                 <a:solidFill>
                   <a:schemeClr val="tx1"/>
                 </a:solidFill>
@@ -3315,7 +3316,7 @@
               </a:rPr>
               <a:t>Estoque de Materiais</a:t>
             </a:r>
-            <a:endParaRPr lang="pt-BR" sz="1200" dirty="0">
+            <a:endParaRPr lang="pt-BR" sz="1500" dirty="0">
               <a:latin typeface="Arial" panose="020B0604020202020204" pitchFamily="34" charset="0"/>
               <a:cs typeface="Arial" panose="020B0604020202020204" pitchFamily="34" charset="0"/>
             </a:endParaRPr>
@@ -3421,7 +3422,7 @@
           <a:p>
             <a:pPr algn="ctr"/>
             <a:r>
-              <a:rPr lang="pt-BR" sz="1200" dirty="0" smtClean="0">
+              <a:rPr lang="pt-BR" sz="1500" dirty="0" smtClean="0">
                 <a:solidFill>
                   <a:schemeClr val="tx1"/>
                 </a:solidFill>
@@ -3430,7 +3431,7 @@
               </a:rPr>
               <a:t>Risco</a:t>
             </a:r>
-            <a:endParaRPr lang="pt-BR" sz="1200" dirty="0">
+            <a:endParaRPr lang="pt-BR" sz="1500" dirty="0">
               <a:latin typeface="Arial" panose="020B0604020202020204" pitchFamily="34" charset="0"/>
               <a:cs typeface="Arial" panose="020B0604020202020204" pitchFamily="34" charset="0"/>
             </a:endParaRPr>
@@ -3536,16 +3537,26 @@
           <a:p>
             <a:pPr algn="ctr"/>
             <a:r>
-              <a:rPr lang="pt-BR" sz="1200" dirty="0" smtClean="0">
+              <a:rPr lang="pt-BR" sz="1500" dirty="0" smtClean="0">
                 <a:solidFill>
                   <a:schemeClr val="tx1"/>
                 </a:solidFill>
                 <a:latin typeface="Arial" panose="020B0604020202020204" pitchFamily="34" charset="0"/>
                 <a:cs typeface="Arial" panose="020B0604020202020204" pitchFamily="34" charset="0"/>
               </a:rPr>
-              <a:t>Enfesto</a:t>
-            </a:r>
-            <a:endParaRPr lang="pt-BR" sz="1200" dirty="0">
+              <a:t>Enfest</a:t>
+            </a:r>
+            <a:r>
+              <a:rPr lang="pt-BR" sz="1500" dirty="0">
+                <a:solidFill>
+                  <a:schemeClr val="tx1"/>
+                </a:solidFill>
+                <a:latin typeface="Arial" panose="020B0604020202020204" pitchFamily="34" charset="0"/>
+                <a:cs typeface="Arial" panose="020B0604020202020204" pitchFamily="34" charset="0"/>
+              </a:rPr>
+              <a:t>o</a:t>
+            </a:r>
+            <a:endParaRPr lang="pt-BR" sz="1500" dirty="0">
               <a:latin typeface="Arial" panose="020B0604020202020204" pitchFamily="34" charset="0"/>
               <a:cs typeface="Arial" panose="020B0604020202020204" pitchFamily="34" charset="0"/>
             </a:endParaRPr>
@@ -3651,7 +3662,7 @@
           <a:p>
             <a:pPr algn="ctr"/>
             <a:r>
-              <a:rPr lang="pt-BR" sz="1200" dirty="0" smtClean="0">
+              <a:rPr lang="pt-BR" sz="1500" dirty="0" smtClean="0">
                 <a:solidFill>
                   <a:schemeClr val="tx1"/>
                 </a:solidFill>
@@ -3660,7 +3671,7 @@
               </a:rPr>
               <a:t>Corte</a:t>
             </a:r>
-            <a:endParaRPr lang="pt-BR" sz="1200" dirty="0">
+            <a:endParaRPr lang="pt-BR" sz="1500" dirty="0">
               <a:latin typeface="Arial" panose="020B0604020202020204" pitchFamily="34" charset="0"/>
               <a:cs typeface="Arial" panose="020B0604020202020204" pitchFamily="34" charset="0"/>
             </a:endParaRPr>
@@ -3766,7 +3777,7 @@
           <a:p>
             <a:pPr algn="ctr"/>
             <a:r>
-              <a:rPr lang="pt-BR" sz="1200" dirty="0" smtClean="0">
+              <a:rPr lang="pt-BR" sz="1500" dirty="0" smtClean="0">
                 <a:solidFill>
                   <a:schemeClr val="tx1"/>
                 </a:solidFill>
@@ -3775,7 +3786,7 @@
               </a:rPr>
               <a:t>Preparação Para Costura</a:t>
             </a:r>
-            <a:endParaRPr lang="pt-BR" sz="1200" dirty="0">
+            <a:endParaRPr lang="pt-BR" sz="1500" dirty="0">
               <a:latin typeface="Arial" panose="020B0604020202020204" pitchFamily="34" charset="0"/>
               <a:cs typeface="Arial" panose="020B0604020202020204" pitchFamily="34" charset="0"/>
             </a:endParaRPr>
@@ -3881,7 +3892,7 @@
           <a:p>
             <a:pPr algn="ctr"/>
             <a:r>
-              <a:rPr lang="pt-BR" sz="1200" dirty="0" smtClean="0">
+              <a:rPr lang="pt-BR" sz="1500" dirty="0" smtClean="0">
                 <a:solidFill>
                   <a:schemeClr val="tx1"/>
                 </a:solidFill>
@@ -3890,7 +3901,7 @@
               </a:rPr>
               <a:t>Costura</a:t>
             </a:r>
-            <a:endParaRPr lang="pt-BR" sz="1200" dirty="0">
+            <a:endParaRPr lang="pt-BR" sz="1500" dirty="0">
               <a:latin typeface="Arial" panose="020B0604020202020204" pitchFamily="34" charset="0"/>
               <a:cs typeface="Arial" panose="020B0604020202020204" pitchFamily="34" charset="0"/>
             </a:endParaRPr>
@@ -3996,7 +4007,7 @@
           <a:p>
             <a:pPr algn="ctr"/>
             <a:r>
-              <a:rPr lang="pt-BR" sz="1200" dirty="0" smtClean="0">
+              <a:rPr lang="pt-BR" sz="1500" dirty="0" smtClean="0">
                 <a:solidFill>
                   <a:schemeClr val="tx1"/>
                 </a:solidFill>
@@ -4005,7 +4016,7 @@
               </a:rPr>
               <a:t>Limpeza da Peça</a:t>
             </a:r>
-            <a:endParaRPr lang="pt-BR" sz="1200" dirty="0">
+            <a:endParaRPr lang="pt-BR" sz="1500" dirty="0">
               <a:latin typeface="Arial" panose="020B0604020202020204" pitchFamily="34" charset="0"/>
               <a:cs typeface="Arial" panose="020B0604020202020204" pitchFamily="34" charset="0"/>
             </a:endParaRPr>
@@ -4111,7 +4122,7 @@
           <a:p>
             <a:pPr algn="ctr"/>
             <a:r>
-              <a:rPr lang="pt-BR" sz="1200" dirty="0" smtClean="0">
+              <a:rPr lang="pt-BR" sz="1500" dirty="0" smtClean="0">
                 <a:solidFill>
                   <a:schemeClr val="tx1"/>
                 </a:solidFill>
@@ -4120,7 +4131,7 @@
               </a:rPr>
               <a:t>Passadoria</a:t>
             </a:r>
-            <a:endParaRPr lang="pt-BR" sz="1200" dirty="0">
+            <a:endParaRPr lang="pt-BR" sz="1500" dirty="0">
               <a:latin typeface="Arial" panose="020B0604020202020204" pitchFamily="34" charset="0"/>
               <a:cs typeface="Arial" panose="020B0604020202020204" pitchFamily="34" charset="0"/>
             </a:endParaRPr>
@@ -4226,7 +4237,7 @@
           <a:p>
             <a:pPr algn="ctr"/>
             <a:r>
-              <a:rPr lang="pt-BR" sz="1200" dirty="0" smtClean="0">
+              <a:rPr lang="pt-BR" sz="1500" dirty="0" smtClean="0">
                 <a:solidFill>
                   <a:schemeClr val="tx1"/>
                 </a:solidFill>
@@ -4235,7 +4246,7 @@
               </a:rPr>
               <a:t>Embalagem</a:t>
             </a:r>
-            <a:endParaRPr lang="pt-BR" sz="1200" dirty="0">
+            <a:endParaRPr lang="pt-BR" sz="1500" dirty="0">
               <a:latin typeface="Arial" panose="020B0604020202020204" pitchFamily="34" charset="0"/>
               <a:cs typeface="Arial" panose="020B0604020202020204" pitchFamily="34" charset="0"/>
             </a:endParaRPr>
@@ -4341,7 +4352,7 @@
           <a:p>
             <a:pPr algn="ctr"/>
             <a:r>
-              <a:rPr lang="pt-BR" sz="1200" dirty="0" smtClean="0">
+              <a:rPr lang="pt-BR" sz="1500" dirty="0" smtClean="0">
                 <a:solidFill>
                   <a:schemeClr val="tx1"/>
                 </a:solidFill>
@@ -4350,7 +4361,7 @@
               </a:rPr>
               <a:t>Estoque de Produtos</a:t>
             </a:r>
-            <a:endParaRPr lang="pt-BR" sz="1200" dirty="0">
+            <a:endParaRPr lang="pt-BR" sz="1500" dirty="0">
               <a:latin typeface="Arial" panose="020B0604020202020204" pitchFamily="34" charset="0"/>
               <a:cs typeface="Arial" panose="020B0604020202020204" pitchFamily="34" charset="0"/>
             </a:endParaRPr>
@@ -4456,7 +4467,7 @@
           <a:p>
             <a:pPr algn="ctr"/>
             <a:r>
-              <a:rPr lang="pt-BR" sz="1200" dirty="0" smtClean="0">
+              <a:rPr lang="pt-BR" sz="1500" dirty="0" smtClean="0">
                 <a:solidFill>
                   <a:schemeClr val="tx1"/>
                 </a:solidFill>
@@ -4465,7 +4476,7 @@
               </a:rPr>
               <a:t>Expedição</a:t>
             </a:r>
-            <a:endParaRPr lang="pt-BR" sz="1200" dirty="0">
+            <a:endParaRPr lang="pt-BR" sz="1500" dirty="0">
               <a:latin typeface="Arial" panose="020B0604020202020204" pitchFamily="34" charset="0"/>
               <a:cs typeface="Arial" panose="020B0604020202020204" pitchFamily="34" charset="0"/>
             </a:endParaRPr>
@@ -4571,7 +4582,7 @@
           <a:p>
             <a:pPr algn="ctr"/>
             <a:r>
-              <a:rPr lang="pt-BR" sz="1200" dirty="0" smtClean="0">
+              <a:rPr lang="pt-BR" sz="1500" dirty="0" smtClean="0">
                 <a:solidFill>
                   <a:schemeClr val="tx1"/>
                 </a:solidFill>
@@ -4580,7 +4591,7 @@
               </a:rPr>
               <a:t>Cliente</a:t>
             </a:r>
-            <a:endParaRPr lang="pt-BR" sz="1200" dirty="0">
+            <a:endParaRPr lang="pt-BR" sz="1500" dirty="0">
               <a:latin typeface="Arial" panose="020B0604020202020204" pitchFamily="34" charset="0"/>
               <a:cs typeface="Arial" panose="020B0604020202020204" pitchFamily="34" charset="0"/>
             </a:endParaRPr>
@@ -6672,7 +6683,7 @@
         </p:nvSpPr>
         <p:spPr>
           <a:xfrm>
-            <a:off x="1078607" y="2736761"/>
+            <a:off x="2294214" y="2163650"/>
             <a:ext cx="2601532" cy="1339403"/>
           </a:xfrm>
           <a:prstGeom prst="ellipse">
@@ -6727,7 +6738,7 @@
         </p:nvSpPr>
         <p:spPr>
           <a:xfrm>
-            <a:off x="9074239" y="2730320"/>
+            <a:off x="7889386" y="2163650"/>
             <a:ext cx="2565043" cy="1315791"/>
           </a:xfrm>
           <a:prstGeom prst="ellipse">
@@ -6782,7 +6793,7 @@
         </p:nvSpPr>
         <p:spPr>
           <a:xfrm>
-            <a:off x="7889383" y="456131"/>
+            <a:off x="7889383" y="108398"/>
             <a:ext cx="2565043" cy="1315791"/>
           </a:xfrm>
           <a:prstGeom prst="ellipse">
@@ -6840,7 +6851,7 @@
         </p:nvSpPr>
         <p:spPr>
           <a:xfrm>
-            <a:off x="2318197" y="515160"/>
+            <a:off x="2318197" y="167427"/>
             <a:ext cx="2565043" cy="1315791"/>
           </a:xfrm>
           <a:prstGeom prst="ellipse">
@@ -6895,7 +6906,7 @@
         </p:nvSpPr>
         <p:spPr>
           <a:xfrm>
-            <a:off x="4958366" y="2395472"/>
+            <a:off x="4868213" y="3606085"/>
             <a:ext cx="2910625" cy="2021982"/>
           </a:xfrm>
           <a:prstGeom prst="diamond">
@@ -6957,7 +6968,7 @@
         </p:nvSpPr>
         <p:spPr>
           <a:xfrm>
-            <a:off x="5325412" y="5105462"/>
+            <a:off x="5235259" y="6316075"/>
             <a:ext cx="2176529" cy="450761"/>
           </a:xfrm>
           <a:prstGeom prst="roundRect">
@@ -7000,7 +7011,7 @@
         </p:nvSpPr>
         <p:spPr>
           <a:xfrm>
-            <a:off x="5228821" y="960617"/>
+            <a:off x="5228821" y="612884"/>
             <a:ext cx="2421228" cy="296086"/>
           </a:xfrm>
           <a:prstGeom prst="rightArrow">
@@ -7048,7 +7059,7 @@
         </p:nvSpPr>
         <p:spPr>
           <a:xfrm>
-            <a:off x="10226769" y="4212997"/>
+            <a:off x="9067670" y="3659208"/>
             <a:ext cx="259984" cy="565597"/>
           </a:xfrm>
           <a:prstGeom prst="downArrow">
@@ -7095,8 +7106,8 @@
           <p:nvPr/>
         </p:nvSpPr>
         <p:spPr>
-          <a:xfrm>
-            <a:off x="7982411" y="3251114"/>
+          <a:xfrm rot="19412480">
+            <a:off x="7759846" y="3814443"/>
             <a:ext cx="978408" cy="310698"/>
           </a:xfrm>
           <a:prstGeom prst="leftArrow">
@@ -7135,8 +7146,8 @@
           <p:nvPr/>
         </p:nvSpPr>
         <p:spPr>
-          <a:xfrm>
-            <a:off x="3866538" y="3232866"/>
+          <a:xfrm rot="2480176">
+            <a:off x="3807375" y="3900694"/>
             <a:ext cx="978408" cy="310698"/>
           </a:xfrm>
           <a:prstGeom prst="leftArrow">
@@ -7170,16 +7181,16 @@
       </p:sp>
       <p:sp>
         <p:nvSpPr>
-          <p:cNvPr id="23" name="Seta para a direita 22"/>
+          <p:cNvPr id="25" name="Seta para baixo 24"/>
           <p:cNvSpPr/>
           <p:nvPr/>
         </p:nvSpPr>
         <p:spPr>
-          <a:xfrm rot="17263975">
-            <a:off x="2464011" y="2132472"/>
-            <a:ext cx="791295" cy="263782"/>
-          </a:xfrm>
-          <a:prstGeom prst="rightArrow">
+          <a:xfrm>
+            <a:off x="6185156" y="5705872"/>
+            <a:ext cx="276737" cy="526966"/>
+          </a:xfrm>
+          <a:prstGeom prst="downArrow">
             <a:avLst/>
           </a:prstGeom>
           <a:solidFill>
@@ -7218,14 +7229,230 @@
       </p:sp>
       <p:sp>
         <p:nvSpPr>
-          <p:cNvPr id="24" name="Seta para baixo 23"/>
+          <p:cNvPr id="26" name="CaixaDeTexto 25"/>
+          <p:cNvSpPr txBox="1"/>
+          <p:nvPr/>
+        </p:nvSpPr>
+        <p:spPr>
+          <a:xfrm>
+            <a:off x="4508965" y="3746848"/>
+            <a:ext cx="465192" cy="276999"/>
+          </a:xfrm>
+          <a:prstGeom prst="rect">
+            <a:avLst/>
+          </a:prstGeom>
+          <a:noFill/>
+        </p:spPr>
+        <p:txBody>
+          <a:bodyPr wrap="none" rtlCol="0">
+            <a:spAutoFit/>
+          </a:bodyPr>
+          <a:lstStyle/>
+          <a:p>
+            <a:r>
+              <a:rPr lang="pt-BR" sz="1200" dirty="0" smtClean="0">
+                <a:latin typeface="Arial" panose="020B0604020202020204" pitchFamily="34" charset="0"/>
+                <a:cs typeface="Arial" panose="020B0604020202020204" pitchFamily="34" charset="0"/>
+              </a:rPr>
+              <a:t>Não</a:t>
+            </a:r>
+            <a:endParaRPr lang="pt-BR" sz="1200" dirty="0">
+              <a:latin typeface="Arial" panose="020B0604020202020204" pitchFamily="34" charset="0"/>
+              <a:cs typeface="Arial" panose="020B0604020202020204" pitchFamily="34" charset="0"/>
+            </a:endParaRPr>
+          </a:p>
+        </p:txBody>
+      </p:sp>
+      <p:sp>
+        <p:nvSpPr>
+          <p:cNvPr id="27" name="CaixaDeTexto 26"/>
+          <p:cNvSpPr txBox="1"/>
+          <p:nvPr/>
+        </p:nvSpPr>
+        <p:spPr>
+          <a:xfrm flipH="1">
+            <a:off x="6461893" y="5712208"/>
+            <a:ext cx="567256" cy="276999"/>
+          </a:xfrm>
+          <a:prstGeom prst="rect">
+            <a:avLst/>
+          </a:prstGeom>
+          <a:noFill/>
+        </p:spPr>
+        <p:txBody>
+          <a:bodyPr wrap="square" rtlCol="0">
+            <a:spAutoFit/>
+          </a:bodyPr>
+          <a:lstStyle/>
+          <a:p>
+            <a:r>
+              <a:rPr lang="pt-BR" sz="1200" dirty="0" smtClean="0">
+                <a:latin typeface="Arial" panose="020B0604020202020204" pitchFamily="34" charset="0"/>
+                <a:cs typeface="Arial" panose="020B0604020202020204" pitchFamily="34" charset="0"/>
+              </a:rPr>
+              <a:t>Sim</a:t>
+            </a:r>
+            <a:endParaRPr lang="pt-BR" sz="1200" dirty="0">
+              <a:latin typeface="Arial" panose="020B0604020202020204" pitchFamily="34" charset="0"/>
+              <a:cs typeface="Arial" panose="020B0604020202020204" pitchFamily="34" charset="0"/>
+            </a:endParaRPr>
+          </a:p>
+        </p:txBody>
+      </p:sp>
+      <p:sp>
+        <p:nvSpPr>
+          <p:cNvPr id="28" name="CaixaDeTexto 27"/>
+          <p:cNvSpPr txBox="1"/>
+          <p:nvPr/>
+        </p:nvSpPr>
+        <p:spPr>
+          <a:xfrm>
+            <a:off x="6726460" y="2222779"/>
+            <a:ext cx="1183317" cy="461665"/>
+          </a:xfrm>
+          <a:prstGeom prst="rect">
+            <a:avLst/>
+          </a:prstGeom>
+          <a:noFill/>
+        </p:spPr>
+        <p:txBody>
+          <a:bodyPr wrap="square" rtlCol="0">
+            <a:spAutoFit/>
+          </a:bodyPr>
+          <a:lstStyle/>
+          <a:p>
+            <a:pPr algn="ctr"/>
+            <a:r>
+              <a:rPr lang="pt-BR" sz="1200" dirty="0" smtClean="0">
+                <a:latin typeface="Arial" panose="020B0604020202020204" pitchFamily="34" charset="0"/>
+                <a:cs typeface="Arial" panose="020B0604020202020204" pitchFamily="34" charset="0"/>
+              </a:rPr>
+              <a:t>Indivíduos</a:t>
+            </a:r>
+          </a:p>
+          <a:p>
+            <a:pPr algn="ctr"/>
+            <a:r>
+              <a:rPr lang="pt-BR" sz="1200" dirty="0" smtClean="0">
+                <a:latin typeface="Arial" panose="020B0604020202020204" pitchFamily="34" charset="0"/>
+                <a:cs typeface="Arial" panose="020B0604020202020204" pitchFamily="34" charset="0"/>
+              </a:rPr>
+              <a:t>Selecionados</a:t>
+            </a:r>
+            <a:endParaRPr lang="pt-BR" sz="1200" dirty="0">
+              <a:latin typeface="Arial" panose="020B0604020202020204" pitchFamily="34" charset="0"/>
+              <a:cs typeface="Arial" panose="020B0604020202020204" pitchFamily="34" charset="0"/>
+            </a:endParaRPr>
+          </a:p>
+        </p:txBody>
+      </p:sp>
+      <p:sp>
+        <p:nvSpPr>
+          <p:cNvPr id="29" name="Fluxograma: Operação manual 28"/>
           <p:cNvSpPr/>
           <p:nvPr/>
         </p:nvSpPr>
         <p:spPr>
-          <a:xfrm rot="20371397">
-            <a:off x="9700694" y="1837493"/>
-            <a:ext cx="289289" cy="813944"/>
+          <a:xfrm>
+            <a:off x="8992019" y="4441667"/>
+            <a:ext cx="363539" cy="533998"/>
+          </a:xfrm>
+          <a:prstGeom prst="flowChartManualOperation">
+            <a:avLst/>
+          </a:prstGeom>
+          <a:solidFill>
+            <a:schemeClr val="bg1"/>
+          </a:solidFill>
+          <a:ln>
+            <a:solidFill>
+              <a:schemeClr val="tx1"/>
+            </a:solidFill>
+          </a:ln>
+        </p:spPr>
+        <p:style>
+          <a:lnRef idx="2">
+            <a:schemeClr val="accent1">
+              <a:shade val="50000"/>
+            </a:schemeClr>
+          </a:lnRef>
+          <a:fillRef idx="1">
+            <a:schemeClr val="accent1"/>
+          </a:fillRef>
+          <a:effectRef idx="0">
+            <a:schemeClr val="accent1"/>
+          </a:effectRef>
+          <a:fontRef idx="minor">
+            <a:schemeClr val="lt1"/>
+          </a:fontRef>
+        </p:style>
+        <p:txBody>
+          <a:bodyPr rtlCol="0" anchor="ctr"/>
+          <a:lstStyle/>
+          <a:p>
+            <a:pPr algn="ctr"/>
+            <a:endParaRPr lang="pt-BR"/>
+          </a:p>
+        </p:txBody>
+      </p:sp>
+      <p:sp>
+        <p:nvSpPr>
+          <p:cNvPr id="30" name="CaixaDeTexto 29"/>
+          <p:cNvSpPr txBox="1"/>
+          <p:nvPr/>
+        </p:nvSpPr>
+        <p:spPr>
+          <a:xfrm>
+            <a:off x="9322614" y="3659208"/>
+            <a:ext cx="1476777" cy="646331"/>
+          </a:xfrm>
+          <a:prstGeom prst="rect">
+            <a:avLst/>
+          </a:prstGeom>
+          <a:noFill/>
+        </p:spPr>
+        <p:txBody>
+          <a:bodyPr wrap="square" rtlCol="0">
+            <a:spAutoFit/>
+          </a:bodyPr>
+          <a:lstStyle/>
+          <a:p>
+            <a:r>
+              <a:rPr lang="pt-BR" sz="1200" dirty="0" smtClean="0">
+                <a:latin typeface="Arial" panose="020B0604020202020204" pitchFamily="34" charset="0"/>
+                <a:cs typeface="Arial" panose="020B0604020202020204" pitchFamily="34" charset="0"/>
+              </a:rPr>
+              <a:t>Indivíduos que </a:t>
+            </a:r>
+            <a:br>
+              <a:rPr lang="pt-BR" sz="1200" dirty="0" smtClean="0">
+                <a:latin typeface="Arial" panose="020B0604020202020204" pitchFamily="34" charset="0"/>
+                <a:cs typeface="Arial" panose="020B0604020202020204" pitchFamily="34" charset="0"/>
+              </a:rPr>
+            </a:br>
+            <a:r>
+              <a:rPr lang="pt-BR" sz="1200" dirty="0" smtClean="0">
+                <a:latin typeface="Arial" panose="020B0604020202020204" pitchFamily="34" charset="0"/>
+                <a:cs typeface="Arial" panose="020B0604020202020204" pitchFamily="34" charset="0"/>
+              </a:rPr>
+              <a:t>não nos interessam</a:t>
+            </a:r>
+            <a:endParaRPr lang="pt-BR" sz="1200" dirty="0">
+              <a:latin typeface="Arial" panose="020B0604020202020204" pitchFamily="34" charset="0"/>
+              <a:cs typeface="Arial" panose="020B0604020202020204" pitchFamily="34" charset="0"/>
+            </a:endParaRPr>
+          </a:p>
+        </p:txBody>
+      </p:sp>
+      <p:sp>
+        <p:nvSpPr>
+          <p:cNvPr id="22" name="Seta para baixo 21"/>
+          <p:cNvSpPr/>
+          <p:nvPr/>
+        </p:nvSpPr>
+        <p:spPr>
+          <a:xfrm>
+            <a:off x="9041912" y="1463898"/>
+            <a:ext cx="259984" cy="565597"/>
           </a:xfrm>
           <a:prstGeom prst="downArrow">
             <a:avLst/>
@@ -7266,16 +7493,16 @@
       </p:sp>
       <p:sp>
         <p:nvSpPr>
-          <p:cNvPr id="25" name="Seta para baixo 24"/>
+          <p:cNvPr id="31" name="Seta para cima 30"/>
           <p:cNvSpPr/>
           <p:nvPr/>
         </p:nvSpPr>
         <p:spPr>
           <a:xfrm>
-            <a:off x="6275309" y="4495259"/>
-            <a:ext cx="276737" cy="526966"/>
-          </a:xfrm>
-          <a:prstGeom prst="downArrow">
+            <a:off x="3470726" y="1557269"/>
+            <a:ext cx="259984" cy="565597"/>
+          </a:xfrm>
+          <a:prstGeom prst="upArrow">
             <a:avLst/>
           </a:prstGeom>
           <a:solidFill>
@@ -7309,209 +7536,6 @@
           <a:p>
             <a:pPr algn="ctr"/>
             <a:endParaRPr lang="pt-BR"/>
-          </a:p>
-        </p:txBody>
-      </p:sp>
-      <p:sp>
-        <p:nvSpPr>
-          <p:cNvPr id="26" name="CaixaDeTexto 25"/>
-          <p:cNvSpPr txBox="1"/>
-          <p:nvPr/>
-        </p:nvSpPr>
-        <p:spPr>
-          <a:xfrm>
-            <a:off x="4161240" y="2974115"/>
-            <a:ext cx="465192" cy="276999"/>
-          </a:xfrm>
-          <a:prstGeom prst="rect">
-            <a:avLst/>
-          </a:prstGeom>
-          <a:noFill/>
-        </p:spPr>
-        <p:txBody>
-          <a:bodyPr wrap="none" rtlCol="0">
-            <a:spAutoFit/>
-          </a:bodyPr>
-          <a:lstStyle/>
-          <a:p>
-            <a:r>
-              <a:rPr lang="pt-BR" sz="1200" dirty="0" smtClean="0">
-                <a:latin typeface="Arial" panose="020B0604020202020204" pitchFamily="34" charset="0"/>
-                <a:cs typeface="Arial" panose="020B0604020202020204" pitchFamily="34" charset="0"/>
-              </a:rPr>
-              <a:t>Não</a:t>
-            </a:r>
-            <a:endParaRPr lang="pt-BR" sz="1200" dirty="0">
-              <a:latin typeface="Arial" panose="020B0604020202020204" pitchFamily="34" charset="0"/>
-              <a:cs typeface="Arial" panose="020B0604020202020204" pitchFamily="34" charset="0"/>
-            </a:endParaRPr>
-          </a:p>
-        </p:txBody>
-      </p:sp>
-      <p:sp>
-        <p:nvSpPr>
-          <p:cNvPr id="27" name="CaixaDeTexto 26"/>
-          <p:cNvSpPr txBox="1"/>
-          <p:nvPr/>
-        </p:nvSpPr>
-        <p:spPr>
-          <a:xfrm flipH="1">
-            <a:off x="6552046" y="4501595"/>
-            <a:ext cx="567256" cy="276999"/>
-          </a:xfrm>
-          <a:prstGeom prst="rect">
-            <a:avLst/>
-          </a:prstGeom>
-          <a:noFill/>
-        </p:spPr>
-        <p:txBody>
-          <a:bodyPr wrap="square" rtlCol="0">
-            <a:spAutoFit/>
-          </a:bodyPr>
-          <a:lstStyle/>
-          <a:p>
-            <a:r>
-              <a:rPr lang="pt-BR" sz="1200" dirty="0" smtClean="0">
-                <a:latin typeface="Arial" panose="020B0604020202020204" pitchFamily="34" charset="0"/>
-                <a:cs typeface="Arial" panose="020B0604020202020204" pitchFamily="34" charset="0"/>
-              </a:rPr>
-              <a:t>Sim</a:t>
-            </a:r>
-            <a:endParaRPr lang="pt-BR" sz="1200" dirty="0">
-              <a:latin typeface="Arial" panose="020B0604020202020204" pitchFamily="34" charset="0"/>
-              <a:cs typeface="Arial" panose="020B0604020202020204" pitchFamily="34" charset="0"/>
-            </a:endParaRPr>
-          </a:p>
-        </p:txBody>
-      </p:sp>
-      <p:sp>
-        <p:nvSpPr>
-          <p:cNvPr id="28" name="CaixaDeTexto 27"/>
-          <p:cNvSpPr txBox="1"/>
-          <p:nvPr/>
-        </p:nvSpPr>
-        <p:spPr>
-          <a:xfrm>
-            <a:off x="7911313" y="2789449"/>
-            <a:ext cx="1183317" cy="461665"/>
-          </a:xfrm>
-          <a:prstGeom prst="rect">
-            <a:avLst/>
-          </a:prstGeom>
-          <a:noFill/>
-        </p:spPr>
-        <p:txBody>
-          <a:bodyPr wrap="square" rtlCol="0">
-            <a:spAutoFit/>
-          </a:bodyPr>
-          <a:lstStyle/>
-          <a:p>
-            <a:pPr algn="ctr"/>
-            <a:r>
-              <a:rPr lang="pt-BR" sz="1200" dirty="0" smtClean="0">
-                <a:latin typeface="Arial" panose="020B0604020202020204" pitchFamily="34" charset="0"/>
-                <a:cs typeface="Arial" panose="020B0604020202020204" pitchFamily="34" charset="0"/>
-              </a:rPr>
-              <a:t>Indivíduos</a:t>
-            </a:r>
-          </a:p>
-          <a:p>
-            <a:pPr algn="ctr"/>
-            <a:r>
-              <a:rPr lang="pt-BR" sz="1200" dirty="0" smtClean="0">
-                <a:latin typeface="Arial" panose="020B0604020202020204" pitchFamily="34" charset="0"/>
-                <a:cs typeface="Arial" panose="020B0604020202020204" pitchFamily="34" charset="0"/>
-              </a:rPr>
-              <a:t>Selecionados</a:t>
-            </a:r>
-            <a:endParaRPr lang="pt-BR" sz="1200" dirty="0">
-              <a:latin typeface="Arial" panose="020B0604020202020204" pitchFamily="34" charset="0"/>
-              <a:cs typeface="Arial" panose="020B0604020202020204" pitchFamily="34" charset="0"/>
-            </a:endParaRPr>
-          </a:p>
-        </p:txBody>
-      </p:sp>
-      <p:sp>
-        <p:nvSpPr>
-          <p:cNvPr id="29" name="Fluxograma: Operação manual 28"/>
-          <p:cNvSpPr/>
-          <p:nvPr/>
-        </p:nvSpPr>
-        <p:spPr>
-          <a:xfrm>
-            <a:off x="10151118" y="4995456"/>
-            <a:ext cx="363539" cy="533998"/>
-          </a:xfrm>
-          <a:prstGeom prst="flowChartManualOperation">
-            <a:avLst/>
-          </a:prstGeom>
-          <a:solidFill>
-            <a:schemeClr val="bg1"/>
-          </a:solidFill>
-          <a:ln>
-            <a:solidFill>
-              <a:schemeClr val="tx1"/>
-            </a:solidFill>
-          </a:ln>
-        </p:spPr>
-        <p:style>
-          <a:lnRef idx="2">
-            <a:schemeClr val="accent1">
-              <a:shade val="50000"/>
-            </a:schemeClr>
-          </a:lnRef>
-          <a:fillRef idx="1">
-            <a:schemeClr val="accent1"/>
-          </a:fillRef>
-          <a:effectRef idx="0">
-            <a:schemeClr val="accent1"/>
-          </a:effectRef>
-          <a:fontRef idx="minor">
-            <a:schemeClr val="lt1"/>
-          </a:fontRef>
-        </p:style>
-        <p:txBody>
-          <a:bodyPr rtlCol="0" anchor="ctr"/>
-          <a:lstStyle/>
-          <a:p>
-            <a:pPr algn="ctr"/>
-            <a:endParaRPr lang="pt-BR"/>
-          </a:p>
-        </p:txBody>
-      </p:sp>
-      <p:sp>
-        <p:nvSpPr>
-          <p:cNvPr id="30" name="CaixaDeTexto 29"/>
-          <p:cNvSpPr txBox="1"/>
-          <p:nvPr/>
-        </p:nvSpPr>
-        <p:spPr>
-          <a:xfrm>
-            <a:off x="10430197" y="4212997"/>
-            <a:ext cx="1476777" cy="461665"/>
-          </a:xfrm>
-          <a:prstGeom prst="rect">
-            <a:avLst/>
-          </a:prstGeom>
-          <a:noFill/>
-        </p:spPr>
-        <p:txBody>
-          <a:bodyPr wrap="square" rtlCol="0">
-            <a:spAutoFit/>
-          </a:bodyPr>
-          <a:lstStyle/>
-          <a:p>
-            <a:r>
-              <a:rPr lang="pt-BR" sz="1200" dirty="0" smtClean="0">
-                <a:latin typeface="Arial" panose="020B0604020202020204" pitchFamily="34" charset="0"/>
-                <a:cs typeface="Arial" panose="020B0604020202020204" pitchFamily="34" charset="0"/>
-              </a:rPr>
-              <a:t>Indivíduos que não nos interessam</a:t>
-            </a:r>
-            <a:endParaRPr lang="pt-BR" sz="1200" dirty="0">
-              <a:latin typeface="Arial" panose="020B0604020202020204" pitchFamily="34" charset="0"/>
-              <a:cs typeface="Arial" panose="020B0604020202020204" pitchFamily="34" charset="0"/>
-            </a:endParaRPr>
           </a:p>
         </p:txBody>
       </p:sp>
@@ -7581,10 +7605,6 @@
               </a:rPr>
               <a:t>S</a:t>
             </a:r>
-            <a:endParaRPr lang="pt-BR" dirty="0">
-              <a:latin typeface="Arial" panose="020B0604020202020204" pitchFamily="34" charset="0"/>
-              <a:cs typeface="Arial" panose="020B0604020202020204" pitchFamily="34" charset="0"/>
-            </a:endParaRPr>
           </a:p>
         </p:txBody>
       </p:sp>
@@ -7693,8 +7713,8 @@
           </a:p>
         </p:txBody>
       </p:sp>
-      <mc:AlternateContent xmlns:mc="http://schemas.openxmlformats.org/markup-compatibility/2006">
-        <mc:Choice xmlns:a14="http://schemas.microsoft.com/office/drawing/2010/main" Requires="a14">
+      <mc:AlternateContent xmlns:mc="http://schemas.openxmlformats.org/markup-compatibility/2006" xmlns:a14="http://schemas.microsoft.com/office/drawing/2010/main">
+        <mc:Choice Requires="a14">
           <p:sp>
             <p:nvSpPr>
               <p:cNvPr id="14" name="CaixaDeTexto 13"/>
@@ -7906,7 +7926,7 @@
             </p:txBody>
           </p:sp>
         </mc:Choice>
-        <mc:Fallback>
+        <mc:Fallback xmlns="">
           <p:sp>
             <p:nvSpPr>
               <p:cNvPr id="14" name="CaixaDeTexto 13"/>
@@ -7945,8 +7965,8 @@
           </p:sp>
         </mc:Fallback>
       </mc:AlternateContent>
-      <mc:AlternateContent xmlns:mc="http://schemas.openxmlformats.org/markup-compatibility/2006">
-        <mc:Choice xmlns:a14="http://schemas.microsoft.com/office/drawing/2010/main" Requires="a14">
+      <mc:AlternateContent xmlns:mc="http://schemas.openxmlformats.org/markup-compatibility/2006" xmlns:a14="http://schemas.microsoft.com/office/drawing/2010/main">
+        <mc:Choice Requires="a14">
           <p:sp>
             <p:nvSpPr>
               <p:cNvPr id="15" name="CaixaDeTexto 14"/>
@@ -8229,7 +8249,7 @@
             </p:txBody>
           </p:sp>
         </mc:Choice>
-        <mc:Fallback>
+        <mc:Fallback xmlns="">
           <p:sp>
             <p:nvSpPr>
               <p:cNvPr id="15" name="CaixaDeTexto 14"/>
@@ -8421,10 +8441,6 @@
               </a:rPr>
               <a:t>S</a:t>
             </a:r>
-            <a:endParaRPr lang="pt-BR" dirty="0">
-              <a:latin typeface="Arial" panose="020B0604020202020204" pitchFamily="34" charset="0"/>
-              <a:cs typeface="Arial" panose="020B0604020202020204" pitchFamily="34" charset="0"/>
-            </a:endParaRPr>
           </a:p>
         </p:txBody>
       </p:sp>
@@ -8533,8 +8549,8 @@
           </a:p>
         </p:txBody>
       </p:sp>
-      <mc:AlternateContent xmlns:mc="http://schemas.openxmlformats.org/markup-compatibility/2006">
-        <mc:Choice xmlns:a14="http://schemas.microsoft.com/office/drawing/2010/main" Requires="a14">
+      <mc:AlternateContent xmlns:mc="http://schemas.openxmlformats.org/markup-compatibility/2006" xmlns:a14="http://schemas.microsoft.com/office/drawing/2010/main">
+        <mc:Choice Requires="a14">
           <p:sp>
             <p:nvSpPr>
               <p:cNvPr id="40" name="CaixaDeTexto 39"/>
@@ -8746,7 +8762,7 @@
             </p:txBody>
           </p:sp>
         </mc:Choice>
-        <mc:Fallback>
+        <mc:Fallback xmlns="">
           <p:sp>
             <p:nvSpPr>
               <p:cNvPr id="40" name="CaixaDeTexto 39"/>
@@ -8785,8 +8801,8 @@
           </p:sp>
         </mc:Fallback>
       </mc:AlternateContent>
-      <mc:AlternateContent xmlns:mc="http://schemas.openxmlformats.org/markup-compatibility/2006">
-        <mc:Choice xmlns:a14="http://schemas.microsoft.com/office/drawing/2010/main" Requires="a14">
+      <mc:AlternateContent xmlns:mc="http://schemas.openxmlformats.org/markup-compatibility/2006" xmlns:a14="http://schemas.microsoft.com/office/drawing/2010/main">
+        <mc:Choice Requires="a14">
           <p:sp>
             <p:nvSpPr>
               <p:cNvPr id="41" name="CaixaDeTexto 40"/>
@@ -9069,7 +9085,7 @@
             </p:txBody>
           </p:sp>
         </mc:Choice>
-        <mc:Fallback>
+        <mc:Fallback xmlns="">
           <p:sp>
             <p:nvSpPr>
               <p:cNvPr id="41" name="CaixaDeTexto 40"/>
@@ -9188,6 +9204,543 @@
     <p:extLst>
       <p:ext uri="{BB962C8B-B14F-4D97-AF65-F5344CB8AC3E}">
         <p14:creationId xmlns:p14="http://schemas.microsoft.com/office/powerpoint/2010/main" val="2533263089"/>
+      </p:ext>
+    </p:extLst>
+  </p:cSld>
+  <p:clrMapOvr>
+    <a:masterClrMapping/>
+  </p:clrMapOvr>
+</p:sld>
+</file>
+
+<file path=ppt/slides/slide6.xml><?xml version="1.0" encoding="utf-8"?>
+<p:sld xmlns:a="http://schemas.openxmlformats.org/drawingml/2006/main" xmlns:r="http://schemas.openxmlformats.org/officeDocument/2006/relationships" xmlns:p="http://schemas.openxmlformats.org/presentationml/2006/main">
+  <p:cSld>
+    <p:spTree>
+      <p:nvGrpSpPr>
+        <p:cNvPr id="1" name=""/>
+        <p:cNvGrpSpPr/>
+        <p:nvPr/>
+      </p:nvGrpSpPr>
+      <p:grpSpPr>
+        <a:xfrm>
+          <a:off x="0" y="0"/>
+          <a:ext cx="0" cy="0"/>
+          <a:chOff x="0" y="0"/>
+          <a:chExt cx="0" cy="0"/>
+        </a:xfrm>
+      </p:grpSpPr>
+      <p:sp>
+        <p:nvSpPr>
+          <p:cNvPr id="12" name="CaixaDeTexto 11"/>
+          <p:cNvSpPr txBox="1"/>
+          <p:nvPr/>
+        </p:nvSpPr>
+        <p:spPr>
+          <a:xfrm>
+            <a:off x="1352282" y="695459"/>
+            <a:ext cx="6233374" cy="4939814"/>
+          </a:xfrm>
+          <a:prstGeom prst="rect">
+            <a:avLst/>
+          </a:prstGeom>
+          <a:noFill/>
+        </p:spPr>
+        <p:txBody>
+          <a:bodyPr wrap="square" rtlCol="0">
+            <a:spAutoFit/>
+          </a:bodyPr>
+          <a:lstStyle/>
+          <a:p>
+            <a:r>
+              <a:rPr lang="pt-BR" sz="1500" dirty="0" smtClean="0">
+                <a:latin typeface="Arial" panose="020B0604020202020204" pitchFamily="34" charset="0"/>
+                <a:cs typeface="Arial" panose="020B0604020202020204" pitchFamily="34" charset="0"/>
+              </a:rPr>
+              <a:t>INICIO</a:t>
+            </a:r>
+          </a:p>
+          <a:p>
+            <a:r>
+              <a:rPr lang="pt-BR" sz="1500" dirty="0">
+                <a:latin typeface="Arial" panose="020B0604020202020204" pitchFamily="34" charset="0"/>
+                <a:cs typeface="Arial" panose="020B0604020202020204" pitchFamily="34" charset="0"/>
+              </a:rPr>
+              <a:t> </a:t>
+            </a:r>
+            <a:r>
+              <a:rPr lang="pt-BR" sz="1500" dirty="0" smtClean="0">
+                <a:latin typeface="Arial" panose="020B0604020202020204" pitchFamily="34" charset="0"/>
+                <a:cs typeface="Arial" panose="020B0604020202020204" pitchFamily="34" charset="0"/>
+              </a:rPr>
+              <a:t>    Obtenha a constante </a:t>
+            </a:r>
+            <a:r>
+              <a:rPr lang="el-GR" sz="1500" dirty="0" smtClean="0">
+                <a:latin typeface="Arial" panose="020B0604020202020204" pitchFamily="34" charset="0"/>
+                <a:cs typeface="Arial" panose="020B0604020202020204" pitchFamily="34" charset="0"/>
+              </a:rPr>
+              <a:t>α</a:t>
+            </a:r>
+            <a:r>
+              <a:rPr lang="pt-BR" sz="1500" dirty="0" smtClean="0">
+                <a:latin typeface="Arial" panose="020B0604020202020204" pitchFamily="34" charset="0"/>
+                <a:cs typeface="Arial" panose="020B0604020202020204" pitchFamily="34" charset="0"/>
+              </a:rPr>
+              <a:t> e o numero de repetições NR</a:t>
+            </a:r>
+          </a:p>
+          <a:p>
+            <a:r>
+              <a:rPr lang="pt-BR" sz="1500" dirty="0">
+                <a:latin typeface="Arial" panose="020B0604020202020204" pitchFamily="34" charset="0"/>
+                <a:cs typeface="Arial" panose="020B0604020202020204" pitchFamily="34" charset="0"/>
+              </a:rPr>
+              <a:t> </a:t>
+            </a:r>
+            <a:r>
+              <a:rPr lang="pt-BR" sz="1500" dirty="0" smtClean="0">
+                <a:latin typeface="Arial" panose="020B0604020202020204" pitchFamily="34" charset="0"/>
+                <a:cs typeface="Arial" panose="020B0604020202020204" pitchFamily="34" charset="0"/>
+              </a:rPr>
+              <a:t>    S ← So;</a:t>
+            </a:r>
+          </a:p>
+          <a:p>
+            <a:r>
+              <a:rPr lang="pt-BR" sz="1500" dirty="0" smtClean="0">
+                <a:latin typeface="Arial" panose="020B0604020202020204" pitchFamily="34" charset="0"/>
+                <a:cs typeface="Arial" panose="020B0604020202020204" pitchFamily="34" charset="0"/>
+              </a:rPr>
+              <a:t>     T </a:t>
+            </a:r>
+            <a:r>
+              <a:rPr lang="pt-BR" sz="1500" dirty="0">
+                <a:latin typeface="Arial" panose="020B0604020202020204" pitchFamily="34" charset="0"/>
+                <a:cs typeface="Arial" panose="020B0604020202020204" pitchFamily="34" charset="0"/>
+              </a:rPr>
+              <a:t>← </a:t>
+            </a:r>
+            <a:r>
+              <a:rPr lang="pt-BR" sz="1500" dirty="0" smtClean="0">
+                <a:latin typeface="Arial" panose="020B0604020202020204" pitchFamily="34" charset="0"/>
+                <a:cs typeface="Arial" panose="020B0604020202020204" pitchFamily="34" charset="0"/>
+              </a:rPr>
+              <a:t>LS;            // Limite Superior</a:t>
+            </a:r>
+          </a:p>
+          <a:p>
+            <a:r>
+              <a:rPr lang="pt-BR" sz="1500" dirty="0">
+                <a:latin typeface="Arial" panose="020B0604020202020204" pitchFamily="34" charset="0"/>
+                <a:cs typeface="Arial" panose="020B0604020202020204" pitchFamily="34" charset="0"/>
+              </a:rPr>
+              <a:t> </a:t>
+            </a:r>
+            <a:r>
+              <a:rPr lang="pt-BR" sz="1500" dirty="0" smtClean="0">
+                <a:latin typeface="Arial" panose="020B0604020202020204" pitchFamily="34" charset="0"/>
+                <a:cs typeface="Arial" panose="020B0604020202020204" pitchFamily="34" charset="0"/>
+              </a:rPr>
+              <a:t>    TMIN </a:t>
+            </a:r>
+            <a:r>
+              <a:rPr lang="pt-BR" sz="1500" dirty="0">
+                <a:latin typeface="Arial" panose="020B0604020202020204" pitchFamily="34" charset="0"/>
+                <a:cs typeface="Arial" panose="020B0604020202020204" pitchFamily="34" charset="0"/>
+              </a:rPr>
+              <a:t>← </a:t>
+            </a:r>
+            <a:r>
+              <a:rPr lang="pt-BR" sz="1500" dirty="0" smtClean="0">
+                <a:latin typeface="Arial" panose="020B0604020202020204" pitchFamily="34" charset="0"/>
+                <a:cs typeface="Arial" panose="020B0604020202020204" pitchFamily="34" charset="0"/>
+              </a:rPr>
+              <a:t>LI      // Limite Inferior</a:t>
+            </a:r>
+          </a:p>
+          <a:p>
+            <a:r>
+              <a:rPr lang="pt-BR" sz="1500" dirty="0">
+                <a:latin typeface="Arial" panose="020B0604020202020204" pitchFamily="34" charset="0"/>
+                <a:cs typeface="Arial" panose="020B0604020202020204" pitchFamily="34" charset="0"/>
+              </a:rPr>
+              <a:t> </a:t>
+            </a:r>
+            <a:r>
+              <a:rPr lang="pt-BR" sz="1500" dirty="0" smtClean="0">
+                <a:latin typeface="Arial" panose="020B0604020202020204" pitchFamily="34" charset="0"/>
+                <a:cs typeface="Arial" panose="020B0604020202020204" pitchFamily="34" charset="0"/>
+              </a:rPr>
+              <a:t>    enquanto (T &lt; TMIN) faça</a:t>
+            </a:r>
+          </a:p>
+          <a:p>
+            <a:r>
+              <a:rPr lang="pt-BR" sz="1500" dirty="0">
+                <a:latin typeface="Arial" panose="020B0604020202020204" pitchFamily="34" charset="0"/>
+                <a:cs typeface="Arial" panose="020B0604020202020204" pitchFamily="34" charset="0"/>
+              </a:rPr>
+              <a:t> </a:t>
+            </a:r>
+            <a:r>
+              <a:rPr lang="pt-BR" sz="1500" dirty="0" smtClean="0">
+                <a:latin typeface="Arial" panose="020B0604020202020204" pitchFamily="34" charset="0"/>
+                <a:cs typeface="Arial" panose="020B0604020202020204" pitchFamily="34" charset="0"/>
+              </a:rPr>
+              <a:t>       para I de 1 até NR faça</a:t>
+            </a:r>
+          </a:p>
+          <a:p>
+            <a:r>
+              <a:rPr lang="pt-BR" sz="1500" dirty="0" smtClean="0">
+                <a:latin typeface="Arial" panose="020B0604020202020204" pitchFamily="34" charset="0"/>
+                <a:cs typeface="Arial" panose="020B0604020202020204" pitchFamily="34" charset="0"/>
+              </a:rPr>
+              <a:t>          / / </a:t>
+            </a:r>
+            <a:r>
+              <a:rPr lang="pt-BR" sz="1500" dirty="0">
+                <a:latin typeface="Arial" panose="020B0604020202020204" pitchFamily="34" charset="0"/>
+                <a:cs typeface="Arial" panose="020B0604020202020204" pitchFamily="34" charset="0"/>
+              </a:rPr>
+              <a:t>S’ recebe uma solução gerada na vizinhança S</a:t>
+            </a:r>
+            <a:endParaRPr lang="pt-BR" sz="1500" dirty="0" smtClean="0">
+              <a:latin typeface="Arial" panose="020B0604020202020204" pitchFamily="34" charset="0"/>
+              <a:cs typeface="Arial" panose="020B0604020202020204" pitchFamily="34" charset="0"/>
+            </a:endParaRPr>
+          </a:p>
+          <a:p>
+            <a:r>
+              <a:rPr lang="pt-BR" sz="1500" dirty="0">
+                <a:latin typeface="Arial" panose="020B0604020202020204" pitchFamily="34" charset="0"/>
+                <a:cs typeface="Arial" panose="020B0604020202020204" pitchFamily="34" charset="0"/>
+              </a:rPr>
+              <a:t> </a:t>
+            </a:r>
+            <a:r>
+              <a:rPr lang="pt-BR" sz="1500" dirty="0" smtClean="0">
+                <a:latin typeface="Arial" panose="020B0604020202020204" pitchFamily="34" charset="0"/>
+                <a:cs typeface="Arial" panose="020B0604020202020204" pitchFamily="34" charset="0"/>
+              </a:rPr>
+              <a:t>         gerar uma solução S’ de N(S); </a:t>
+            </a:r>
+          </a:p>
+          <a:p>
+            <a:r>
+              <a:rPr lang="pt-BR" sz="1500" dirty="0">
+                <a:latin typeface="Arial" panose="020B0604020202020204" pitchFamily="34" charset="0"/>
+                <a:cs typeface="Arial" panose="020B0604020202020204" pitchFamily="34" charset="0"/>
+              </a:rPr>
+              <a:t> </a:t>
+            </a:r>
+            <a:r>
+              <a:rPr lang="pt-BR" sz="1500" dirty="0" smtClean="0">
+                <a:latin typeface="Arial" panose="020B0604020202020204" pitchFamily="34" charset="0"/>
+                <a:cs typeface="Arial" panose="020B0604020202020204" pitchFamily="34" charset="0"/>
+              </a:rPr>
+              <a:t>         avaliar a variação de energia;</a:t>
+            </a:r>
+          </a:p>
+          <a:p>
+            <a:r>
+              <a:rPr lang="pt-BR" sz="1500" dirty="0">
+                <a:latin typeface="Arial" panose="020B0604020202020204" pitchFamily="34" charset="0"/>
+                <a:cs typeface="Arial" panose="020B0604020202020204" pitchFamily="34" charset="0"/>
+              </a:rPr>
+              <a:t> </a:t>
+            </a:r>
+            <a:r>
+              <a:rPr lang="pt-BR" sz="1500" dirty="0" smtClean="0">
+                <a:latin typeface="Arial" panose="020B0604020202020204" pitchFamily="34" charset="0"/>
+                <a:cs typeface="Arial" panose="020B0604020202020204" pitchFamily="34" charset="0"/>
+              </a:rPr>
+              <a:t>         se ∆E &lt;= 0 então   // </a:t>
+            </a:r>
+            <a:r>
+              <a:rPr lang="pt-BR" sz="1500" dirty="0">
+                <a:latin typeface="Arial" panose="020B0604020202020204" pitchFamily="34" charset="0"/>
+                <a:cs typeface="Arial" panose="020B0604020202020204" pitchFamily="34" charset="0"/>
+              </a:rPr>
+              <a:t>∆E </a:t>
+            </a:r>
+            <a:r>
+              <a:rPr lang="pt-BR" sz="1500" dirty="0" smtClean="0">
+                <a:latin typeface="Arial" panose="020B0604020202020204" pitchFamily="34" charset="0"/>
+                <a:cs typeface="Arial" panose="020B0604020202020204" pitchFamily="34" charset="0"/>
+              </a:rPr>
+              <a:t>= f(S’)-f(S)</a:t>
+            </a:r>
+          </a:p>
+          <a:p>
+            <a:r>
+              <a:rPr lang="pt-BR" sz="1500" dirty="0">
+                <a:latin typeface="Arial" panose="020B0604020202020204" pitchFamily="34" charset="0"/>
+                <a:cs typeface="Arial" panose="020B0604020202020204" pitchFamily="34" charset="0"/>
+              </a:rPr>
+              <a:t> </a:t>
+            </a:r>
+            <a:r>
+              <a:rPr lang="pt-BR" sz="1500" dirty="0" smtClean="0">
+                <a:latin typeface="Arial" panose="020B0604020202020204" pitchFamily="34" charset="0"/>
+                <a:cs typeface="Arial" panose="020B0604020202020204" pitchFamily="34" charset="0"/>
+              </a:rPr>
+              <a:t>            S ← S’;</a:t>
+            </a:r>
+          </a:p>
+          <a:p>
+            <a:r>
+              <a:rPr lang="pt-BR" sz="1500" dirty="0">
+                <a:latin typeface="Arial" panose="020B0604020202020204" pitchFamily="34" charset="0"/>
+                <a:cs typeface="Arial" panose="020B0604020202020204" pitchFamily="34" charset="0"/>
+              </a:rPr>
+              <a:t> </a:t>
+            </a:r>
+            <a:r>
+              <a:rPr lang="pt-BR" sz="1500" dirty="0" smtClean="0">
+                <a:latin typeface="Arial" panose="020B0604020202020204" pitchFamily="34" charset="0"/>
+                <a:cs typeface="Arial" panose="020B0604020202020204" pitchFamily="34" charset="0"/>
+              </a:rPr>
+              <a:t>         senão</a:t>
+            </a:r>
+          </a:p>
+          <a:p>
+            <a:r>
+              <a:rPr lang="pt-BR" sz="1500" dirty="0">
+                <a:latin typeface="Arial" panose="020B0604020202020204" pitchFamily="34" charset="0"/>
+                <a:cs typeface="Arial" panose="020B0604020202020204" pitchFamily="34" charset="0"/>
+              </a:rPr>
+              <a:t> </a:t>
+            </a:r>
+            <a:r>
+              <a:rPr lang="pt-BR" sz="1500" dirty="0" smtClean="0">
+                <a:latin typeface="Arial" panose="020B0604020202020204" pitchFamily="34" charset="0"/>
+                <a:cs typeface="Arial" panose="020B0604020202020204" pitchFamily="34" charset="0"/>
+              </a:rPr>
+              <a:t>            gerar rand </a:t>
+            </a:r>
+            <a:r>
+              <a:rPr lang="az-Cyrl-AZ" sz="1500" dirty="0" smtClean="0">
+                <a:latin typeface="Arial" panose="020B0604020202020204" pitchFamily="34" charset="0"/>
+                <a:cs typeface="Arial" panose="020B0604020202020204" pitchFamily="34" charset="0"/>
+              </a:rPr>
+              <a:t>є</a:t>
+            </a:r>
+            <a:r>
+              <a:rPr lang="pt-BR" sz="1500" dirty="0" smtClean="0">
+                <a:latin typeface="Arial" panose="020B0604020202020204" pitchFamily="34" charset="0"/>
+                <a:cs typeface="Arial" panose="020B0604020202020204" pitchFamily="34" charset="0"/>
+              </a:rPr>
+              <a:t> Randon [0 , 1];</a:t>
+            </a:r>
+          </a:p>
+          <a:p>
+            <a:r>
+              <a:rPr lang="pt-BR" sz="1500" dirty="0">
+                <a:latin typeface="Arial" panose="020B0604020202020204" pitchFamily="34" charset="0"/>
+                <a:cs typeface="Arial" panose="020B0604020202020204" pitchFamily="34" charset="0"/>
+              </a:rPr>
+              <a:t> </a:t>
+            </a:r>
+            <a:r>
+              <a:rPr lang="pt-BR" sz="1500" dirty="0" smtClean="0">
+                <a:latin typeface="Arial" panose="020B0604020202020204" pitchFamily="34" charset="0"/>
+                <a:cs typeface="Arial" panose="020B0604020202020204" pitchFamily="34" charset="0"/>
+              </a:rPr>
+              <a:t>            se rand &lt; exp(-∆E/T) então</a:t>
+            </a:r>
+          </a:p>
+          <a:p>
+            <a:r>
+              <a:rPr lang="pt-BR" sz="1500" dirty="0" smtClean="0">
+                <a:latin typeface="Arial" panose="020B0604020202020204" pitchFamily="34" charset="0"/>
+                <a:cs typeface="Arial" panose="020B0604020202020204" pitchFamily="34" charset="0"/>
+              </a:rPr>
+              <a:t>                S </a:t>
+            </a:r>
+            <a:r>
+              <a:rPr lang="pt-BR" sz="1500" dirty="0">
+                <a:latin typeface="Arial" panose="020B0604020202020204" pitchFamily="34" charset="0"/>
+                <a:cs typeface="Arial" panose="020B0604020202020204" pitchFamily="34" charset="0"/>
+              </a:rPr>
+              <a:t>← S</a:t>
+            </a:r>
+            <a:r>
+              <a:rPr lang="pt-BR" sz="1500" dirty="0" smtClean="0">
+                <a:latin typeface="Arial" panose="020B0604020202020204" pitchFamily="34" charset="0"/>
+                <a:cs typeface="Arial" panose="020B0604020202020204" pitchFamily="34" charset="0"/>
+              </a:rPr>
+              <a:t>’;</a:t>
+            </a:r>
+          </a:p>
+          <a:p>
+            <a:r>
+              <a:rPr lang="pt-BR" sz="1500" dirty="0">
+                <a:latin typeface="Arial" panose="020B0604020202020204" pitchFamily="34" charset="0"/>
+                <a:cs typeface="Arial" panose="020B0604020202020204" pitchFamily="34" charset="0"/>
+              </a:rPr>
+              <a:t> </a:t>
+            </a:r>
+            <a:r>
+              <a:rPr lang="pt-BR" sz="1500" dirty="0" smtClean="0">
+                <a:latin typeface="Arial" panose="020B0604020202020204" pitchFamily="34" charset="0"/>
+                <a:cs typeface="Arial" panose="020B0604020202020204" pitchFamily="34" charset="0"/>
+              </a:rPr>
+              <a:t>            fimSe</a:t>
+            </a:r>
+          </a:p>
+          <a:p>
+            <a:r>
+              <a:rPr lang="pt-BR" sz="1500" dirty="0">
+                <a:latin typeface="Arial" panose="020B0604020202020204" pitchFamily="34" charset="0"/>
+                <a:cs typeface="Arial" panose="020B0604020202020204" pitchFamily="34" charset="0"/>
+              </a:rPr>
+              <a:t> </a:t>
+            </a:r>
+            <a:r>
+              <a:rPr lang="pt-BR" sz="1500" dirty="0" smtClean="0">
+                <a:latin typeface="Arial" panose="020B0604020202020204" pitchFamily="34" charset="0"/>
+                <a:cs typeface="Arial" panose="020B0604020202020204" pitchFamily="34" charset="0"/>
+              </a:rPr>
+              <a:t>         fimSe</a:t>
+            </a:r>
+          </a:p>
+          <a:p>
+            <a:r>
+              <a:rPr lang="pt-BR" sz="1500" dirty="0">
+                <a:latin typeface="Arial" panose="020B0604020202020204" pitchFamily="34" charset="0"/>
+                <a:cs typeface="Arial" panose="020B0604020202020204" pitchFamily="34" charset="0"/>
+              </a:rPr>
+              <a:t> </a:t>
+            </a:r>
+            <a:r>
+              <a:rPr lang="pt-BR" sz="1500" dirty="0" smtClean="0">
+                <a:latin typeface="Arial" panose="020B0604020202020204" pitchFamily="34" charset="0"/>
+                <a:cs typeface="Arial" panose="020B0604020202020204" pitchFamily="34" charset="0"/>
+              </a:rPr>
+              <a:t>       fimPara</a:t>
+            </a:r>
+          </a:p>
+          <a:p>
+            <a:r>
+              <a:rPr lang="pt-BR" sz="1500" dirty="0">
+                <a:latin typeface="Arial" panose="020B0604020202020204" pitchFamily="34" charset="0"/>
+                <a:cs typeface="Arial" panose="020B0604020202020204" pitchFamily="34" charset="0"/>
+              </a:rPr>
+              <a:t> </a:t>
+            </a:r>
+            <a:r>
+              <a:rPr lang="pt-BR" sz="1500" dirty="0" smtClean="0">
+                <a:latin typeface="Arial" panose="020B0604020202020204" pitchFamily="34" charset="0"/>
+                <a:cs typeface="Arial" panose="020B0604020202020204" pitchFamily="34" charset="0"/>
+              </a:rPr>
+              <a:t>       T</a:t>
+            </a:r>
+            <a:r>
+              <a:rPr lang="pt-BR" sz="1500" dirty="0">
+                <a:latin typeface="Arial" panose="020B0604020202020204" pitchFamily="34" charset="0"/>
+                <a:cs typeface="Arial" panose="020B0604020202020204" pitchFamily="34" charset="0"/>
+              </a:rPr>
+              <a:t> </a:t>
+            </a:r>
+            <a:r>
+              <a:rPr lang="pt-BR" sz="1500" dirty="0" smtClean="0">
+                <a:latin typeface="Arial" panose="020B0604020202020204" pitchFamily="34" charset="0"/>
+                <a:cs typeface="Arial" panose="020B0604020202020204" pitchFamily="34" charset="0"/>
+              </a:rPr>
+              <a:t>← T * </a:t>
+            </a:r>
+            <a:r>
+              <a:rPr lang="el-GR" sz="1500" dirty="0" smtClean="0">
+                <a:latin typeface="Arial" panose="020B0604020202020204" pitchFamily="34" charset="0"/>
+                <a:cs typeface="Arial" panose="020B0604020202020204" pitchFamily="34" charset="0"/>
+              </a:rPr>
+              <a:t>α</a:t>
+            </a:r>
+            <a:r>
+              <a:rPr lang="pt-BR" sz="1500" dirty="0" smtClean="0">
+                <a:latin typeface="Arial" panose="020B0604020202020204" pitchFamily="34" charset="0"/>
+                <a:cs typeface="Arial" panose="020B0604020202020204" pitchFamily="34" charset="0"/>
+              </a:rPr>
+              <a:t>;</a:t>
+            </a:r>
+          </a:p>
+          <a:p>
+            <a:r>
+              <a:rPr lang="pt-BR" sz="1500" dirty="0">
+                <a:latin typeface="Arial" panose="020B0604020202020204" pitchFamily="34" charset="0"/>
+                <a:cs typeface="Arial" panose="020B0604020202020204" pitchFamily="34" charset="0"/>
+              </a:rPr>
+              <a:t> </a:t>
+            </a:r>
+            <a:r>
+              <a:rPr lang="pt-BR" sz="1500" dirty="0" smtClean="0">
+                <a:latin typeface="Arial" panose="020B0604020202020204" pitchFamily="34" charset="0"/>
+                <a:cs typeface="Arial" panose="020B0604020202020204" pitchFamily="34" charset="0"/>
+              </a:rPr>
+              <a:t>    fimEnquanto </a:t>
+            </a:r>
+          </a:p>
+        </p:txBody>
+      </p:sp>
+      <p:sp>
+        <p:nvSpPr>
+          <p:cNvPr id="13" name="Retângulo 12"/>
+          <p:cNvSpPr/>
+          <p:nvPr/>
+        </p:nvSpPr>
+        <p:spPr>
+          <a:xfrm>
+            <a:off x="1081826" y="695459"/>
+            <a:ext cx="5769736" cy="5151549"/>
+          </a:xfrm>
+          <a:prstGeom prst="rect">
+            <a:avLst/>
+          </a:prstGeom>
+          <a:noFill/>
+          <a:ln>
+            <a:solidFill>
+              <a:schemeClr val="tx1"/>
+            </a:solidFill>
+          </a:ln>
+          <a:effectLst>
+            <a:outerShdw blurRad="50800" dist="38100" dir="8100000" algn="tr" rotWithShape="0">
+              <a:prstClr val="black">
+                <a:alpha val="40000"/>
+              </a:prstClr>
+            </a:outerShdw>
+          </a:effectLst>
+        </p:spPr>
+        <p:style>
+          <a:lnRef idx="2">
+            <a:schemeClr val="accent1">
+              <a:shade val="50000"/>
+            </a:schemeClr>
+          </a:lnRef>
+          <a:fillRef idx="1">
+            <a:schemeClr val="accent1"/>
+          </a:fillRef>
+          <a:effectRef idx="0">
+            <a:schemeClr val="accent1"/>
+          </a:effectRef>
+          <a:fontRef idx="minor">
+            <a:schemeClr val="lt1"/>
+          </a:fontRef>
+        </p:style>
+        <p:txBody>
+          <a:bodyPr rtlCol="0" anchor="ctr"/>
+          <a:lstStyle/>
+          <a:p>
+            <a:pPr algn="ctr"/>
+            <a:endParaRPr lang="pt-BR"/>
+          </a:p>
+        </p:txBody>
+      </p:sp>
+    </p:spTree>
+    <p:extLst>
+      <p:ext uri="{BB962C8B-B14F-4D97-AF65-F5344CB8AC3E}">
+        <p14:creationId xmlns:p14="http://schemas.microsoft.com/office/powerpoint/2010/main" val="2430928797"/>
       </p:ext>
     </p:extLst>
   </p:cSld>

</xml_diff>